<commit_message>
Part 3: Adding slide for demo
</commit_message>
<xml_diff>
--- a/Slides/03_MakeAppsFaster.pptx
+++ b/Slides/03_MakeAppsFaster.pptx
@@ -5,7 +5,7 @@
     <p:sldMasterId id="2147483663" r:id="rId1"/>
   </p:sldMasterIdLst>
   <p:notesMasterIdLst>
-    <p:notesMasterId r:id="rId42"/>
+    <p:notesMasterId r:id="rId43"/>
   </p:notesMasterIdLst>
   <p:sldIdLst>
     <p:sldId id="256" r:id="rId2"/>
@@ -42,12 +42,13 @@
     <p:sldId id="272" r:id="rId33"/>
     <p:sldId id="273" r:id="rId34"/>
     <p:sldId id="274" r:id="rId35"/>
-    <p:sldId id="275" r:id="rId36"/>
-    <p:sldId id="291" r:id="rId37"/>
-    <p:sldId id="292" r:id="rId38"/>
-    <p:sldId id="293" r:id="rId39"/>
-    <p:sldId id="294" r:id="rId40"/>
-    <p:sldId id="295" r:id="rId41"/>
+    <p:sldId id="296" r:id="rId36"/>
+    <p:sldId id="275" r:id="rId37"/>
+    <p:sldId id="291" r:id="rId38"/>
+    <p:sldId id="292" r:id="rId39"/>
+    <p:sldId id="293" r:id="rId40"/>
+    <p:sldId id="294" r:id="rId41"/>
+    <p:sldId id="295" r:id="rId42"/>
   </p:sldIdLst>
   <p:sldSz cx="12192000" cy="6858000"/>
   <p:notesSz cx="6858000" cy="9144000"/>
@@ -236,7 +237,7 @@
           <a:p>
             <a:fld id="{3324CFE8-E6C5-49C4-A98E-8439CAAD63D0}" type="datetimeFigureOut">
               <a:rPr lang="en-US" smtClean="0"/>
-              <a:t>2/26/2018</a:t>
+              <a:t>2/28/2018</a:t>
             </a:fld>
             <a:endParaRPr lang="en-US"/>
           </a:p>
@@ -9165,6 +9166,124 @@
   <p:cSld>
     <p:spTree>
       <p:nvGrpSpPr>
+        <p:cNvPr id="1" name="Shape 268"/>
+        <p:cNvGrpSpPr/>
+        <p:nvPr/>
+      </p:nvGrpSpPr>
+      <p:grpSpPr>
+        <a:xfrm>
+          <a:off x="0" y="0"/>
+          <a:ext cx="0" cy="0"/>
+          <a:chOff x="0" y="0"/>
+          <a:chExt cx="0" cy="0"/>
+        </a:xfrm>
+      </p:grpSpPr>
+      <p:sp>
+        <p:nvSpPr>
+          <p:cNvPr id="269" name="Shape 269"/>
+          <p:cNvSpPr>
+            <a:spLocks noGrp="1" noRot="1" noChangeAspect="1"/>
+          </p:cNvSpPr>
+          <p:nvPr>
+            <p:ph type="sldImg" idx="2"/>
+          </p:nvPr>
+        </p:nvSpPr>
+        <p:spPr>
+          <a:xfrm>
+            <a:off x="381000" y="685800"/>
+            <a:ext cx="6096000" cy="3429000"/>
+          </a:xfrm>
+          <a:custGeom>
+            <a:avLst/>
+            <a:gdLst/>
+            <a:ahLst/>
+            <a:cxnLst/>
+            <a:rect l="0" t="0" r="0" b="0"/>
+            <a:pathLst>
+              <a:path w="120000" h="120000" extrusionOk="0">
+                <a:moveTo>
+                  <a:pt x="0" y="0"/>
+                </a:moveTo>
+                <a:lnTo>
+                  <a:pt x="120000" y="0"/>
+                </a:lnTo>
+                <a:lnTo>
+                  <a:pt x="120000" y="120000"/>
+                </a:lnTo>
+                <a:lnTo>
+                  <a:pt x="0" y="120000"/>
+                </a:lnTo>
+                <a:close/>
+              </a:path>
+            </a:pathLst>
+          </a:custGeom>
+        </p:spPr>
+      </p:sp>
+      <p:sp>
+        <p:nvSpPr>
+          <p:cNvPr id="270" name="Shape 270"/>
+          <p:cNvSpPr txBox="1">
+            <a:spLocks noGrp="1"/>
+          </p:cNvSpPr>
+          <p:nvPr>
+            <p:ph type="body" idx="1"/>
+          </p:nvPr>
+        </p:nvSpPr>
+        <p:spPr>
+          <a:xfrm>
+            <a:off x="685800" y="4343400"/>
+            <a:ext cx="5486400" cy="4114800"/>
+          </a:xfrm>
+          <a:prstGeom prst="rect">
+            <a:avLst/>
+          </a:prstGeom>
+        </p:spPr>
+        <p:txBody>
+          <a:bodyPr lIns="91425" tIns="91425" rIns="91425" bIns="91425" anchor="t" anchorCtr="0">
+            <a:noAutofit/>
+          </a:bodyPr>
+          <a:lstStyle/>
+          <a:p>
+            <a:pPr lvl="0" rtl="0">
+              <a:spcBef>
+                <a:spcPts val="0"/>
+              </a:spcBef>
+              <a:buNone/>
+            </a:pPr>
+            <a:r>
+              <a:rPr lang="en-US" b="0" dirty="0"/>
+              <a:t>Thanks for watching! IN the next video we will compare and measure the difference between value types and reference types with </a:t>
+            </a:r>
+            <a:r>
+              <a:rPr lang="en-US" b="0" dirty="0" err="1"/>
+              <a:t>benchmarkdotnet</a:t>
+            </a:r>
+            <a:r>
+              <a:rPr lang="en-US" b="0" dirty="0"/>
+              <a:t>,.</a:t>
+            </a:r>
+            <a:endParaRPr b="0" dirty="0"/>
+          </a:p>
+        </p:txBody>
+      </p:sp>
+    </p:spTree>
+    <p:extLst>
+      <p:ext uri="{BB962C8B-B14F-4D97-AF65-F5344CB8AC3E}">
+        <p14:creationId xmlns:p14="http://schemas.microsoft.com/office/powerpoint/2010/main" val="1681818486"/>
+      </p:ext>
+    </p:extLst>
+  </p:cSld>
+  <p:clrMapOvr>
+    <a:masterClrMapping/>
+  </p:clrMapOvr>
+</p:notes>
+</file>
+
+<file path=ppt/notesSlides/notesSlide35.xml><?xml version="1.0" encoding="utf-8"?>
+<p:notes xmlns:a="http://schemas.openxmlformats.org/drawingml/2006/main" xmlns:r="http://schemas.openxmlformats.org/officeDocument/2006/relationships" xmlns:p="http://schemas.openxmlformats.org/presentationml/2006/main" showMasterSp="0" showMasterPhAnim="0">
+  <p:cSld>
+    <p:spTree>
+      <p:nvGrpSpPr>
         <p:cNvPr id="1" name="Shape 144"/>
         <p:cNvGrpSpPr/>
         <p:nvPr/>
@@ -9593,7 +9712,7 @@
 </p:notes>
 </file>
 
-<file path=ppt/notesSlides/notesSlide35.xml><?xml version="1.0" encoding="utf-8"?>
+<file path=ppt/notesSlides/notesSlide36.xml><?xml version="1.0" encoding="utf-8"?>
 <p:notes xmlns:a="http://schemas.openxmlformats.org/drawingml/2006/main" xmlns:r="http://schemas.openxmlformats.org/officeDocument/2006/relationships" xmlns:p="http://schemas.openxmlformats.org/presentationml/2006/main" showMasterSp="0" showMasterPhAnim="0">
   <p:cSld>
     <p:spTree>
@@ -9737,7 +9856,7 @@
 </p:notes>
 </file>
 
-<file path=ppt/notesSlides/notesSlide36.xml><?xml version="1.0" encoding="utf-8"?>
+<file path=ppt/notesSlides/notesSlide37.xml><?xml version="1.0" encoding="utf-8"?>
 <p:notes xmlns:a="http://schemas.openxmlformats.org/drawingml/2006/main" xmlns:r="http://schemas.openxmlformats.org/officeDocument/2006/relationships" xmlns:p="http://schemas.openxmlformats.org/presentationml/2006/main" showMasterSp="0" showMasterPhAnim="0">
   <p:cSld>
     <p:spTree>
@@ -9961,7 +10080,7 @@
 </p:notes>
 </file>
 
-<file path=ppt/notesSlides/notesSlide37.xml><?xml version="1.0" encoding="utf-8"?>
+<file path=ppt/notesSlides/notesSlide38.xml><?xml version="1.0" encoding="utf-8"?>
 <p:notes xmlns:a="http://schemas.openxmlformats.org/drawingml/2006/main" xmlns:r="http://schemas.openxmlformats.org/officeDocument/2006/relationships" xmlns:p="http://schemas.openxmlformats.org/presentationml/2006/main" showMasterSp="0" showMasterPhAnim="0">
   <p:cSld>
     <p:spTree>
@@ -10157,7 +10276,7 @@
 </p:notes>
 </file>
 
-<file path=ppt/notesSlides/notesSlide38.xml><?xml version="1.0" encoding="utf-8"?>
+<file path=ppt/notesSlides/notesSlide39.xml><?xml version="1.0" encoding="utf-8"?>
 <p:notes xmlns:a="http://schemas.openxmlformats.org/drawingml/2006/main" xmlns:r="http://schemas.openxmlformats.org/officeDocument/2006/relationships" xmlns:p="http://schemas.openxmlformats.org/presentationml/2006/main" showMasterSp="0" showMasterPhAnim="0">
   <p:cSld>
     <p:spTree>
@@ -10496,131 +10615,6 @@
     <p:extLst>
       <p:ext uri="{BB962C8B-B14F-4D97-AF65-F5344CB8AC3E}">
         <p14:creationId xmlns:p14="http://schemas.microsoft.com/office/powerpoint/2010/main" val="3519638097"/>
-      </p:ext>
-    </p:extLst>
-  </p:cSld>
-  <p:clrMapOvr>
-    <a:masterClrMapping/>
-  </p:clrMapOvr>
-</p:notes>
-</file>
-
-<file path=ppt/notesSlides/notesSlide39.xml><?xml version="1.0" encoding="utf-8"?>
-<p:notes xmlns:a="http://schemas.openxmlformats.org/drawingml/2006/main" xmlns:r="http://schemas.openxmlformats.org/officeDocument/2006/relationships" xmlns:p="http://schemas.openxmlformats.org/presentationml/2006/main" showMasterSp="0" showMasterPhAnim="0">
-  <p:cSld>
-    <p:spTree>
-      <p:nvGrpSpPr>
-        <p:cNvPr id="1" name="Shape 244"/>
-        <p:cNvGrpSpPr/>
-        <p:nvPr/>
-      </p:nvGrpSpPr>
-      <p:grpSpPr>
-        <a:xfrm>
-          <a:off x="0" y="0"/>
-          <a:ext cx="0" cy="0"/>
-          <a:chOff x="0" y="0"/>
-          <a:chExt cx="0" cy="0"/>
-        </a:xfrm>
-      </p:grpSpPr>
-      <p:sp>
-        <p:nvSpPr>
-          <p:cNvPr id="245" name="Shape 245"/>
-          <p:cNvSpPr>
-            <a:spLocks noGrp="1" noRot="1" noChangeAspect="1"/>
-          </p:cNvSpPr>
-          <p:nvPr>
-            <p:ph type="sldImg" idx="2"/>
-          </p:nvPr>
-        </p:nvSpPr>
-        <p:spPr>
-          <a:xfrm>
-            <a:off x="381000" y="685800"/>
-            <a:ext cx="6096000" cy="3429000"/>
-          </a:xfrm>
-          <a:custGeom>
-            <a:avLst/>
-            <a:gdLst/>
-            <a:ahLst/>
-            <a:cxnLst/>
-            <a:rect l="0" t="0" r="0" b="0"/>
-            <a:pathLst>
-              <a:path w="120000" h="120000" extrusionOk="0">
-                <a:moveTo>
-                  <a:pt x="0" y="0"/>
-                </a:moveTo>
-                <a:lnTo>
-                  <a:pt x="120000" y="0"/>
-                </a:lnTo>
-                <a:lnTo>
-                  <a:pt x="120000" y="120000"/>
-                </a:lnTo>
-                <a:lnTo>
-                  <a:pt x="0" y="120000"/>
-                </a:lnTo>
-                <a:close/>
-              </a:path>
-            </a:pathLst>
-          </a:custGeom>
-        </p:spPr>
-      </p:sp>
-      <p:sp>
-        <p:nvSpPr>
-          <p:cNvPr id="246" name="Shape 246"/>
-          <p:cNvSpPr txBox="1">
-            <a:spLocks noGrp="1"/>
-          </p:cNvSpPr>
-          <p:nvPr>
-            <p:ph type="body" idx="1"/>
-          </p:nvPr>
-        </p:nvSpPr>
-        <p:spPr>
-          <a:xfrm>
-            <a:off x="685800" y="4343400"/>
-            <a:ext cx="5486400" cy="4114800"/>
-          </a:xfrm>
-          <a:prstGeom prst="rect">
-            <a:avLst/>
-          </a:prstGeom>
-        </p:spPr>
-        <p:txBody>
-          <a:bodyPr lIns="91425" tIns="91425" rIns="91425" bIns="91425" anchor="t" anchorCtr="0">
-            <a:noAutofit/>
-          </a:bodyPr>
-          <a:lstStyle/>
-          <a:p>
-            <a:pPr lvl="0" rtl="0">
-              <a:spcBef>
-                <a:spcPts val="0"/>
-              </a:spcBef>
-              <a:buNone/>
-            </a:pPr>
-            <a:r>
-              <a:rPr lang="en-US" dirty="0"/>
-              <a:t>So here is how the picture looks like with </a:t>
-            </a:r>
-            <a:r>
-              <a:rPr lang="en-US" dirty="0" err="1"/>
-              <a:t>crossgen</a:t>
-            </a:r>
-            <a:r>
-              <a:rPr lang="en-US" dirty="0"/>
-              <a:t>. There is basically no code compilation at runtime. The C# compiler compiles C# to IL and then </a:t>
-            </a:r>
-            <a:r>
-              <a:rPr lang="en-US" dirty="0" err="1"/>
-              <a:t>CrossGen</a:t>
-            </a:r>
-            <a:r>
-              <a:rPr lang="en-US" dirty="0"/>
-              <a:t> compiles IL to machine code. Both of those happen at compile time. </a:t>
-            </a:r>
-          </a:p>
-        </p:txBody>
-      </p:sp>
-    </p:spTree>
-    <p:extLst>
-      <p:ext uri="{BB962C8B-B14F-4D97-AF65-F5344CB8AC3E}">
-        <p14:creationId xmlns:p14="http://schemas.microsoft.com/office/powerpoint/2010/main" val="866126016"/>
       </p:ext>
     </p:extLst>
   </p:cSld>
@@ -10855,6 +10849,131 @@
     <p:extLst>
       <p:ext uri="{BB962C8B-B14F-4D97-AF65-F5344CB8AC3E}">
         <p14:creationId xmlns:p14="http://schemas.microsoft.com/office/powerpoint/2010/main" val="2339301525"/>
+      </p:ext>
+    </p:extLst>
+  </p:cSld>
+  <p:clrMapOvr>
+    <a:masterClrMapping/>
+  </p:clrMapOvr>
+</p:notes>
+</file>
+
+<file path=ppt/notesSlides/notesSlide40.xml><?xml version="1.0" encoding="utf-8"?>
+<p:notes xmlns:a="http://schemas.openxmlformats.org/drawingml/2006/main" xmlns:r="http://schemas.openxmlformats.org/officeDocument/2006/relationships" xmlns:p="http://schemas.openxmlformats.org/presentationml/2006/main" showMasterSp="0" showMasterPhAnim="0">
+  <p:cSld>
+    <p:spTree>
+      <p:nvGrpSpPr>
+        <p:cNvPr id="1" name="Shape 244"/>
+        <p:cNvGrpSpPr/>
+        <p:nvPr/>
+      </p:nvGrpSpPr>
+      <p:grpSpPr>
+        <a:xfrm>
+          <a:off x="0" y="0"/>
+          <a:ext cx="0" cy="0"/>
+          <a:chOff x="0" y="0"/>
+          <a:chExt cx="0" cy="0"/>
+        </a:xfrm>
+      </p:grpSpPr>
+      <p:sp>
+        <p:nvSpPr>
+          <p:cNvPr id="245" name="Shape 245"/>
+          <p:cNvSpPr>
+            <a:spLocks noGrp="1" noRot="1" noChangeAspect="1"/>
+          </p:cNvSpPr>
+          <p:nvPr>
+            <p:ph type="sldImg" idx="2"/>
+          </p:nvPr>
+        </p:nvSpPr>
+        <p:spPr>
+          <a:xfrm>
+            <a:off x="381000" y="685800"/>
+            <a:ext cx="6096000" cy="3429000"/>
+          </a:xfrm>
+          <a:custGeom>
+            <a:avLst/>
+            <a:gdLst/>
+            <a:ahLst/>
+            <a:cxnLst/>
+            <a:rect l="0" t="0" r="0" b="0"/>
+            <a:pathLst>
+              <a:path w="120000" h="120000" extrusionOk="0">
+                <a:moveTo>
+                  <a:pt x="0" y="0"/>
+                </a:moveTo>
+                <a:lnTo>
+                  <a:pt x="120000" y="0"/>
+                </a:lnTo>
+                <a:lnTo>
+                  <a:pt x="120000" y="120000"/>
+                </a:lnTo>
+                <a:lnTo>
+                  <a:pt x="0" y="120000"/>
+                </a:lnTo>
+                <a:close/>
+              </a:path>
+            </a:pathLst>
+          </a:custGeom>
+        </p:spPr>
+      </p:sp>
+      <p:sp>
+        <p:nvSpPr>
+          <p:cNvPr id="246" name="Shape 246"/>
+          <p:cNvSpPr txBox="1">
+            <a:spLocks noGrp="1"/>
+          </p:cNvSpPr>
+          <p:nvPr>
+            <p:ph type="body" idx="1"/>
+          </p:nvPr>
+        </p:nvSpPr>
+        <p:spPr>
+          <a:xfrm>
+            <a:off x="685800" y="4343400"/>
+            <a:ext cx="5486400" cy="4114800"/>
+          </a:xfrm>
+          <a:prstGeom prst="rect">
+            <a:avLst/>
+          </a:prstGeom>
+        </p:spPr>
+        <p:txBody>
+          <a:bodyPr lIns="91425" tIns="91425" rIns="91425" bIns="91425" anchor="t" anchorCtr="0">
+            <a:noAutofit/>
+          </a:bodyPr>
+          <a:lstStyle/>
+          <a:p>
+            <a:pPr lvl="0" rtl="0">
+              <a:spcBef>
+                <a:spcPts val="0"/>
+              </a:spcBef>
+              <a:buNone/>
+            </a:pPr>
+            <a:r>
+              <a:rPr lang="en-US" dirty="0"/>
+              <a:t>So here is how the picture looks like with </a:t>
+            </a:r>
+            <a:r>
+              <a:rPr lang="en-US" dirty="0" err="1"/>
+              <a:t>crossgen</a:t>
+            </a:r>
+            <a:r>
+              <a:rPr lang="en-US" dirty="0"/>
+              <a:t>. There is basically no code compilation at runtime. The C# compiler compiles C# to IL and then </a:t>
+            </a:r>
+            <a:r>
+              <a:rPr lang="en-US" dirty="0" err="1"/>
+              <a:t>CrossGen</a:t>
+            </a:r>
+            <a:r>
+              <a:rPr lang="en-US" dirty="0"/>
+              <a:t> compiles IL to machine code. Both of those happen at compile time. </a:t>
+            </a:r>
+          </a:p>
+        </p:txBody>
+      </p:sp>
+    </p:spTree>
+    <p:extLst>
+      <p:ext uri="{BB962C8B-B14F-4D97-AF65-F5344CB8AC3E}">
+        <p14:creationId xmlns:p14="http://schemas.microsoft.com/office/powerpoint/2010/main" val="866126016"/>
       </p:ext>
     </p:extLst>
   </p:cSld>
@@ -13319,7 +13438,7 @@
           <a:p>
             <a:fld id="{A186C422-ECB4-4C69-9D54-F0AFA5DD4A3A}" type="datetimeFigureOut">
               <a:rPr lang="en-US" smtClean="0"/>
-              <a:t>2/26/2018</a:t>
+              <a:t>2/28/2018</a:t>
             </a:fld>
             <a:endParaRPr lang="en-US"/>
           </a:p>
@@ -13432,7 +13551,7 @@
           <a:p>
             <a:fld id="{A186C422-ECB4-4C69-9D54-F0AFA5DD4A3A}" type="datetimeFigureOut">
               <a:rPr lang="en-US" smtClean="0"/>
-              <a:t>2/26/2018</a:t>
+              <a:t>2/28/2018</a:t>
             </a:fld>
             <a:endParaRPr lang="en-US"/>
           </a:p>
@@ -13745,7 +13864,7 @@
           <a:p>
             <a:fld id="{A186C422-ECB4-4C69-9D54-F0AFA5DD4A3A}" type="datetimeFigureOut">
               <a:rPr lang="en-US" smtClean="0"/>
-              <a:t>2/26/2018</a:t>
+              <a:t>2/28/2018</a:t>
             </a:fld>
             <a:endParaRPr lang="en-US"/>
           </a:p>
@@ -14038,7 +14157,7 @@
           <a:p>
             <a:fld id="{A186C422-ECB4-4C69-9D54-F0AFA5DD4A3A}" type="datetimeFigureOut">
               <a:rPr lang="en-US" smtClean="0"/>
-              <a:t>2/26/2018</a:t>
+              <a:t>2/28/2018</a:t>
             </a:fld>
             <a:endParaRPr lang="en-US"/>
           </a:p>
@@ -14238,7 +14357,7 @@
           <a:p>
             <a:fld id="{A186C422-ECB4-4C69-9D54-F0AFA5DD4A3A}" type="datetimeFigureOut">
               <a:rPr lang="en-US" smtClean="0"/>
-              <a:t>2/26/2018</a:t>
+              <a:t>2/28/2018</a:t>
             </a:fld>
             <a:endParaRPr lang="en-US"/>
           </a:p>
@@ -14448,7 +14567,7 @@
           <a:p>
             <a:fld id="{A186C422-ECB4-4C69-9D54-F0AFA5DD4A3A}" type="datetimeFigureOut">
               <a:rPr lang="en-US" smtClean="0"/>
-              <a:t>2/26/2018</a:t>
+              <a:t>2/28/2018</a:t>
             </a:fld>
             <a:endParaRPr lang="en-US"/>
           </a:p>
@@ -18265,7 +18384,7 @@
           <a:p>
             <a:fld id="{A186C422-ECB4-4C69-9D54-F0AFA5DD4A3A}" type="datetimeFigureOut">
               <a:rPr lang="en-US" smtClean="0"/>
-              <a:t>2/26/2018</a:t>
+              <a:t>2/28/2018</a:t>
             </a:fld>
             <a:endParaRPr lang="en-US"/>
           </a:p>
@@ -18508,7 +18627,7 @@
           <a:p>
             <a:fld id="{A186C422-ECB4-4C69-9D54-F0AFA5DD4A3A}" type="datetimeFigureOut">
               <a:rPr lang="en-US" smtClean="0"/>
-              <a:t>2/26/2018</a:t>
+              <a:t>2/28/2018</a:t>
             </a:fld>
             <a:endParaRPr lang="en-US"/>
           </a:p>
@@ -38109,34 +38228,6 @@
           </a:p>
         </p:txBody>
       </p:sp>
-      <p:sp>
-        <p:nvSpPr>
-          <p:cNvPr id="5" name="Subtitle 4">
-            <a:extLst>
-              <a:ext uri="{FF2B5EF4-FFF2-40B4-BE49-F238E27FC236}">
-                <a16:creationId xmlns:a16="http://schemas.microsoft.com/office/drawing/2014/main" id="{EDCF4D89-16A6-4F1D-A2E4-19352ECC9329}"/>
-              </a:ext>
-            </a:extLst>
-          </p:cNvPr>
-          <p:cNvSpPr>
-            <a:spLocks noGrp="1"/>
-          </p:cNvSpPr>
-          <p:nvPr>
-            <p:ph type="subTitle" idx="1"/>
-          </p:nvPr>
-        </p:nvSpPr>
-        <p:spPr/>
-        <p:txBody>
-          <a:bodyPr/>
-          <a:lstStyle/>
-          <a:p>
-            <a:r>
-              <a:rPr lang="en-US" dirty="0"/>
-              <a:t>Video 4.3</a:t>
-            </a:r>
-          </a:p>
-        </p:txBody>
-      </p:sp>
       <p:cxnSp>
         <p:nvCxnSpPr>
           <p:cNvPr id="7" name="Straight Connector 6">
@@ -40511,7 +40602,7 @@
   <p:cSld>
     <p:spTree>
       <p:nvGrpSpPr>
-        <p:cNvPr id="1" name="Shape 147"/>
+        <p:cNvPr id="1" name="Shape 271"/>
         <p:cNvGrpSpPr/>
         <p:nvPr/>
       </p:nvGrpSpPr>
@@ -40525,96 +40616,7 @@
       </p:grpSpPr>
       <p:sp>
         <p:nvSpPr>
-          <p:cNvPr id="148" name="Shape 148"/>
-          <p:cNvSpPr txBox="1">
-            <a:spLocks noGrp="1"/>
-          </p:cNvSpPr>
-          <p:nvPr>
-            <p:ph type="title"/>
-          </p:nvPr>
-        </p:nvSpPr>
-        <p:spPr/>
-        <p:txBody>
-          <a:bodyPr/>
-          <a:lstStyle/>
-          <a:p>
-            <a:pPr lvl="0"/>
-            <a:r>
-              <a:rPr lang="en-US"/>
-              <a:t>So why is this good?</a:t>
-            </a:r>
-            <a:endParaRPr lang="en-US" dirty="0"/>
-          </a:p>
-        </p:txBody>
-      </p:sp>
-      <p:sp>
-        <p:nvSpPr>
-          <p:cNvPr id="149" name="Shape 149"/>
-          <p:cNvSpPr txBox="1">
-            <a:spLocks noGrp="1"/>
-          </p:cNvSpPr>
-          <p:nvPr>
-            <p:ph sz="quarter" idx="10"/>
-          </p:nvPr>
-        </p:nvSpPr>
-        <p:spPr/>
-        <p:txBody>
-          <a:bodyPr/>
-          <a:lstStyle/>
-          <a:p>
-            <a:r>
-              <a:rPr lang="en-US"/>
-              <a:t>By using the await keyword the thread which starts the operation does not sit and wait until the result is there.</a:t>
-            </a:r>
-          </a:p>
-          <a:p>
-            <a:r>
-              <a:rPr lang="en-US"/>
-              <a:t>In ASP.NET Core applications: with parallel requests you can save threads from the threadpool</a:t>
-            </a:r>
-          </a:p>
-          <a:p>
-            <a:r>
-              <a:rPr lang="en-US"/>
-              <a:t>In GUI applications: no heavy work on the UI thread</a:t>
-            </a:r>
-            <a:endParaRPr lang="en-US" dirty="0"/>
-          </a:p>
-        </p:txBody>
-      </p:sp>
-    </p:spTree>
-    <p:extLst>
-      <p:ext uri="{BB962C8B-B14F-4D97-AF65-F5344CB8AC3E}">
-        <p14:creationId xmlns:p14="http://schemas.microsoft.com/office/powerpoint/2010/main" val="2610028307"/>
-      </p:ext>
-    </p:extLst>
-  </p:cSld>
-  <p:clrMapOvr>
-    <a:masterClrMapping/>
-  </p:clrMapOvr>
-</p:sld>
-</file>
-
-<file path=ppt/slides/slide36.xml><?xml version="1.0" encoding="utf-8"?>
-<p:sld xmlns:a="http://schemas.openxmlformats.org/drawingml/2006/main" xmlns:r="http://schemas.openxmlformats.org/officeDocument/2006/relationships" xmlns:p="http://schemas.openxmlformats.org/presentationml/2006/main">
-  <p:cSld>
-    <p:spTree>
-      <p:nvGrpSpPr>
-        <p:cNvPr id="1" name="Shape 166"/>
-        <p:cNvGrpSpPr/>
-        <p:nvPr/>
-      </p:nvGrpSpPr>
-      <p:grpSpPr>
-        <a:xfrm>
-          <a:off x="0" y="0"/>
-          <a:ext cx="0" cy="0"/>
-          <a:chOff x="0" y="0"/>
-          <a:chExt cx="0" cy="0"/>
-        </a:xfrm>
-      </p:grpSpPr>
-      <p:sp>
-        <p:nvSpPr>
-          <p:cNvPr id="167" name="Shape 167"/>
+          <p:cNvPr id="272" name="Shape 272"/>
           <p:cNvSpPr txBox="1">
             <a:spLocks noGrp="1"/>
           </p:cNvSpPr>
@@ -40622,14 +40624,21 @@
             <p:ph type="ctrTitle"/>
           </p:nvPr>
         </p:nvSpPr>
-        <p:spPr/>
+        <p:spPr>
+          <a:xfrm>
+            <a:off x="658040" y="944481"/>
+            <a:ext cx="11533960" cy="2357461"/>
+          </a:xfrm>
+        </p:spPr>
         <p:txBody>
-          <a:bodyPr/>
+          <a:bodyPr>
+            <a:normAutofit/>
+          </a:bodyPr>
           <a:lstStyle/>
           <a:p>
             <a:r>
               <a:rPr lang="en-US" dirty="0"/>
-              <a:t>Ahead of Time (AOT) Compilation</a:t>
+              <a:t>Asynchronous programming n .NET - Demo</a:t>
             </a:r>
             <a:endParaRPr lang="en-US" noProof="0" dirty="0"/>
           </a:p>
@@ -40637,10 +40646,10 @@
       </p:sp>
       <p:cxnSp>
         <p:nvCxnSpPr>
-          <p:cNvPr id="7" name="Straight Connector 6">
+          <p:cNvPr id="6" name="Straight Connector 5">
             <a:extLst>
               <a:ext uri="{FF2B5EF4-FFF2-40B4-BE49-F238E27FC236}">
-                <a16:creationId xmlns:a16="http://schemas.microsoft.com/office/drawing/2014/main" id="{7027BEC0-4507-460C-BFB1-A40036D64E90}"/>
+                <a16:creationId xmlns:a16="http://schemas.microsoft.com/office/drawing/2014/main" id="{9EA7A283-A419-429C-9FFB-5639D2D95C02}"/>
               </a:ext>
             </a:extLst>
           </p:cNvPr>
@@ -40652,7 +40661,7 @@
         <p:spPr>
           <a:xfrm>
             <a:off x="816834" y="3301942"/>
-            <a:ext cx="9444766" cy="0"/>
+            <a:ext cx="10666105" cy="0"/>
           </a:xfrm>
           <a:prstGeom prst="line">
             <a:avLst/>
@@ -40707,10 +40716,38 @@
           </a:fontRef>
         </p:style>
       </p:cxnSp>
+      <p:sp>
+        <p:nvSpPr>
+          <p:cNvPr id="3" name="Subtitle 2">
+            <a:extLst>
+              <a:ext uri="{FF2B5EF4-FFF2-40B4-BE49-F238E27FC236}">
+                <a16:creationId xmlns:a16="http://schemas.microsoft.com/office/drawing/2014/main" id="{355E7E9F-D080-456A-B8D4-BB6BC4B304CE}"/>
+              </a:ext>
+            </a:extLst>
+          </p:cNvPr>
+          <p:cNvSpPr>
+            <a:spLocks noGrp="1"/>
+          </p:cNvSpPr>
+          <p:nvPr>
+            <p:ph type="subTitle" idx="1"/>
+          </p:nvPr>
+        </p:nvSpPr>
+        <p:spPr/>
+        <p:txBody>
+          <a:bodyPr/>
+          <a:lstStyle/>
+          <a:p>
+            <a:r>
+              <a:rPr lang="en-US" dirty="0"/>
+              <a:t>Demo</a:t>
+            </a:r>
+          </a:p>
+        </p:txBody>
+      </p:sp>
     </p:spTree>
     <p:extLst>
       <p:ext uri="{BB962C8B-B14F-4D97-AF65-F5344CB8AC3E}">
-        <p14:creationId xmlns:p14="http://schemas.microsoft.com/office/powerpoint/2010/main" val="424560616"/>
+        <p14:creationId xmlns:p14="http://schemas.microsoft.com/office/powerpoint/2010/main" val="4012164764"/>
       </p:ext>
     </p:extLst>
   </p:cSld>
@@ -40720,7 +40757,7 @@
 </p:sld>
 </file>
 
-<file path=ppt/slides/slide37.xml><?xml version="1.0" encoding="utf-8"?>
+<file path=ppt/slides/slide36.xml><?xml version="1.0" encoding="utf-8"?>
 <p:sld xmlns:a="http://schemas.openxmlformats.org/drawingml/2006/main" xmlns:r="http://schemas.openxmlformats.org/officeDocument/2006/relationships" xmlns:p="http://schemas.openxmlformats.org/presentationml/2006/main">
   <p:cSld>
     <p:spTree>
@@ -40754,6 +40791,220 @@
           <a:p>
             <a:pPr lvl="0"/>
             <a:r>
+              <a:rPr lang="en-US"/>
+              <a:t>So why is this good?</a:t>
+            </a:r>
+            <a:endParaRPr lang="en-US" dirty="0"/>
+          </a:p>
+        </p:txBody>
+      </p:sp>
+      <p:sp>
+        <p:nvSpPr>
+          <p:cNvPr id="149" name="Shape 149"/>
+          <p:cNvSpPr txBox="1">
+            <a:spLocks noGrp="1"/>
+          </p:cNvSpPr>
+          <p:nvPr>
+            <p:ph sz="quarter" idx="10"/>
+          </p:nvPr>
+        </p:nvSpPr>
+        <p:spPr/>
+        <p:txBody>
+          <a:bodyPr/>
+          <a:lstStyle/>
+          <a:p>
+            <a:r>
+              <a:rPr lang="en-US"/>
+              <a:t>By using the await keyword the thread which starts the operation does not sit and wait until the result is there.</a:t>
+            </a:r>
+          </a:p>
+          <a:p>
+            <a:r>
+              <a:rPr lang="en-US"/>
+              <a:t>In ASP.NET Core applications: with parallel requests you can save threads from the threadpool</a:t>
+            </a:r>
+          </a:p>
+          <a:p>
+            <a:r>
+              <a:rPr lang="en-US"/>
+              <a:t>In GUI applications: no heavy work on the UI thread</a:t>
+            </a:r>
+            <a:endParaRPr lang="en-US" dirty="0"/>
+          </a:p>
+        </p:txBody>
+      </p:sp>
+    </p:spTree>
+    <p:extLst>
+      <p:ext uri="{BB962C8B-B14F-4D97-AF65-F5344CB8AC3E}">
+        <p14:creationId xmlns:p14="http://schemas.microsoft.com/office/powerpoint/2010/main" val="2610028307"/>
+      </p:ext>
+    </p:extLst>
+  </p:cSld>
+  <p:clrMapOvr>
+    <a:masterClrMapping/>
+  </p:clrMapOvr>
+</p:sld>
+</file>
+
+<file path=ppt/slides/slide37.xml><?xml version="1.0" encoding="utf-8"?>
+<p:sld xmlns:a="http://schemas.openxmlformats.org/drawingml/2006/main" xmlns:r="http://schemas.openxmlformats.org/officeDocument/2006/relationships" xmlns:p="http://schemas.openxmlformats.org/presentationml/2006/main">
+  <p:cSld>
+    <p:spTree>
+      <p:nvGrpSpPr>
+        <p:cNvPr id="1" name="Shape 166"/>
+        <p:cNvGrpSpPr/>
+        <p:nvPr/>
+      </p:nvGrpSpPr>
+      <p:grpSpPr>
+        <a:xfrm>
+          <a:off x="0" y="0"/>
+          <a:ext cx="0" cy="0"/>
+          <a:chOff x="0" y="0"/>
+          <a:chExt cx="0" cy="0"/>
+        </a:xfrm>
+      </p:grpSpPr>
+      <p:sp>
+        <p:nvSpPr>
+          <p:cNvPr id="167" name="Shape 167"/>
+          <p:cNvSpPr txBox="1">
+            <a:spLocks noGrp="1"/>
+          </p:cNvSpPr>
+          <p:nvPr>
+            <p:ph type="ctrTitle"/>
+          </p:nvPr>
+        </p:nvSpPr>
+        <p:spPr/>
+        <p:txBody>
+          <a:bodyPr/>
+          <a:lstStyle/>
+          <a:p>
+            <a:r>
+              <a:rPr lang="en-US" dirty="0"/>
+              <a:t>Ahead of Time (AOT) Compilation</a:t>
+            </a:r>
+            <a:endParaRPr lang="en-US" noProof="0" dirty="0"/>
+          </a:p>
+        </p:txBody>
+      </p:sp>
+      <p:cxnSp>
+        <p:nvCxnSpPr>
+          <p:cNvPr id="7" name="Straight Connector 6">
+            <a:extLst>
+              <a:ext uri="{FF2B5EF4-FFF2-40B4-BE49-F238E27FC236}">
+                <a16:creationId xmlns:a16="http://schemas.microsoft.com/office/drawing/2014/main" id="{7027BEC0-4507-460C-BFB1-A40036D64E90}"/>
+              </a:ext>
+            </a:extLst>
+          </p:cNvPr>
+          <p:cNvCxnSpPr>
+            <a:cxnSpLocks/>
+          </p:cNvCxnSpPr>
+          <p:nvPr/>
+        </p:nvCxnSpPr>
+        <p:spPr>
+          <a:xfrm>
+            <a:off x="816834" y="3301942"/>
+            <a:ext cx="9444766" cy="0"/>
+          </a:xfrm>
+          <a:prstGeom prst="line">
+            <a:avLst/>
+          </a:prstGeom>
+          <a:ln>
+            <a:gradFill>
+              <a:gsLst>
+                <a:gs pos="33670">
+                  <a:srgbClr val="D4DFF1"/>
+                </a:gs>
+                <a:gs pos="0">
+                  <a:schemeClr val="accent1">
+                    <a:lumMod val="5000"/>
+                    <a:lumOff val="95000"/>
+                  </a:schemeClr>
+                </a:gs>
+                <a:gs pos="74000">
+                  <a:schemeClr val="accent1">
+                    <a:lumMod val="45000"/>
+                    <a:lumOff val="55000"/>
+                  </a:schemeClr>
+                </a:gs>
+                <a:gs pos="83000">
+                  <a:schemeClr val="accent1">
+                    <a:lumMod val="45000"/>
+                    <a:lumOff val="55000"/>
+                  </a:schemeClr>
+                </a:gs>
+                <a:gs pos="100000">
+                  <a:schemeClr val="accent1">
+                    <a:lumMod val="30000"/>
+                    <a:lumOff val="70000"/>
+                  </a:schemeClr>
+                </a:gs>
+              </a:gsLst>
+              <a:lin ang="5400000" scaled="1"/>
+            </a:gradFill>
+          </a:ln>
+        </p:spPr>
+        <p:style>
+          <a:lnRef idx="1">
+            <a:schemeClr val="accent1"/>
+          </a:lnRef>
+          <a:fillRef idx="0">
+            <a:schemeClr val="accent1"/>
+          </a:fillRef>
+          <a:effectRef idx="0">
+            <a:schemeClr val="accent1"/>
+          </a:effectRef>
+          <a:fontRef idx="minor">
+            <a:schemeClr val="tx1"/>
+          </a:fontRef>
+        </p:style>
+      </p:cxnSp>
+    </p:spTree>
+    <p:extLst>
+      <p:ext uri="{BB962C8B-B14F-4D97-AF65-F5344CB8AC3E}">
+        <p14:creationId xmlns:p14="http://schemas.microsoft.com/office/powerpoint/2010/main" val="424560616"/>
+      </p:ext>
+    </p:extLst>
+  </p:cSld>
+  <p:clrMapOvr>
+    <a:masterClrMapping/>
+  </p:clrMapOvr>
+</p:sld>
+</file>
+
+<file path=ppt/slides/slide38.xml><?xml version="1.0" encoding="utf-8"?>
+<p:sld xmlns:a="http://schemas.openxmlformats.org/drawingml/2006/main" xmlns:r="http://schemas.openxmlformats.org/officeDocument/2006/relationships" xmlns:p="http://schemas.openxmlformats.org/presentationml/2006/main">
+  <p:cSld>
+    <p:spTree>
+      <p:nvGrpSpPr>
+        <p:cNvPr id="1" name="Shape 147"/>
+        <p:cNvGrpSpPr/>
+        <p:nvPr/>
+      </p:nvGrpSpPr>
+      <p:grpSpPr>
+        <a:xfrm>
+          <a:off x="0" y="0"/>
+          <a:ext cx="0" cy="0"/>
+          <a:chOff x="0" y="0"/>
+          <a:chExt cx="0" cy="0"/>
+        </a:xfrm>
+      </p:grpSpPr>
+      <p:sp>
+        <p:nvSpPr>
+          <p:cNvPr id="148" name="Shape 148"/>
+          <p:cNvSpPr txBox="1">
+            <a:spLocks noGrp="1"/>
+          </p:cNvSpPr>
+          <p:nvPr>
+            <p:ph type="title"/>
+          </p:nvPr>
+        </p:nvSpPr>
+        <p:spPr/>
+        <p:txBody>
+          <a:bodyPr/>
+          <a:lstStyle/>
+          <a:p>
+            <a:pPr lvl="0"/>
+            <a:r>
               <a:rPr lang="en-US" dirty="0"/>
               <a:t>In this Video</a:t>
             </a:r>
@@ -40806,7 +41057,7 @@
 </p:sld>
 </file>
 
-<file path=ppt/slides/slide38.xml><?xml version="1.0" encoding="utf-8"?>
+<file path=ppt/slides/slide39.xml><?xml version="1.0" encoding="utf-8"?>
 <p:sld xmlns:a="http://schemas.openxmlformats.org/drawingml/2006/main" xmlns:r="http://schemas.openxmlformats.org/officeDocument/2006/relationships" xmlns:p="http://schemas.openxmlformats.org/presentationml/2006/main">
   <p:cSld>
     <p:spTree>
@@ -41390,7 +41641,626 @@
 </p:sld>
 </file>
 
-<file path=ppt/slides/slide39.xml><?xml version="1.0" encoding="utf-8"?>
+<file path=ppt/slides/slide4.xml><?xml version="1.0" encoding="utf-8"?>
+<p:sld xmlns:a="http://schemas.openxmlformats.org/drawingml/2006/main" xmlns:r="http://schemas.openxmlformats.org/officeDocument/2006/relationships" xmlns:p="http://schemas.openxmlformats.org/presentationml/2006/main">
+  <p:cSld>
+    <p:spTree>
+      <p:nvGrpSpPr>
+        <p:cNvPr id="1" name="Shape 211"/>
+        <p:cNvGrpSpPr/>
+        <p:nvPr/>
+      </p:nvGrpSpPr>
+      <p:grpSpPr>
+        <a:xfrm>
+          <a:off x="0" y="0"/>
+          <a:ext cx="0" cy="0"/>
+          <a:chOff x="0" y="0"/>
+          <a:chExt cx="0" cy="0"/>
+        </a:xfrm>
+      </p:grpSpPr>
+      <p:sp>
+        <p:nvSpPr>
+          <p:cNvPr id="212" name="Shape 212"/>
+          <p:cNvSpPr txBox="1">
+            <a:spLocks noGrp="1"/>
+          </p:cNvSpPr>
+          <p:nvPr>
+            <p:ph type="title"/>
+          </p:nvPr>
+        </p:nvSpPr>
+        <p:spPr/>
+        <p:txBody>
+          <a:bodyPr/>
+          <a:lstStyle/>
+          <a:p>
+            <a:r>
+              <a:rPr lang="en-US"/>
+              <a:t>Array </a:t>
+            </a:r>
+            <a:endParaRPr lang="en-US" dirty="0"/>
+          </a:p>
+        </p:txBody>
+      </p:sp>
+      <p:sp>
+        <p:nvSpPr>
+          <p:cNvPr id="213" name="Shape 213"/>
+          <p:cNvSpPr txBox="1">
+            <a:spLocks noGrp="1"/>
+          </p:cNvSpPr>
+          <p:nvPr>
+            <p:ph sz="quarter" idx="10"/>
+          </p:nvPr>
+        </p:nvSpPr>
+        <p:spPr/>
+        <p:txBody>
+          <a:bodyPr/>
+          <a:lstStyle/>
+          <a:p>
+            <a:r>
+              <a:rPr lang="en-US" dirty="0"/>
+              <a:t>Very effective in terms of memory</a:t>
+            </a:r>
+          </a:p>
+          <a:p>
+            <a:r>
+              <a:rPr lang="en-US" dirty="0"/>
+              <a:t>Items are stored in a single block right next to each other </a:t>
+            </a:r>
+          </a:p>
+          <a:p>
+            <a:r>
+              <a:rPr lang="en-US" dirty="0"/>
+              <a:t>Accessing elements: very fast</a:t>
+            </a:r>
+          </a:p>
+          <a:p>
+            <a:r>
+              <a:rPr lang="en-US" dirty="0"/>
+              <a:t>Fixed size, you cannot add/remove items</a:t>
+            </a:r>
+          </a:p>
+          <a:p>
+            <a:r>
+              <a:rPr lang="en-US" dirty="0"/>
+              <a:t>Searching an item in an array: O(N)</a:t>
+            </a:r>
+          </a:p>
+        </p:txBody>
+      </p:sp>
+      <p:sp>
+        <p:nvSpPr>
+          <p:cNvPr id="3" name="Rectangle 2">
+            <a:extLst>
+              <a:ext uri="{FF2B5EF4-FFF2-40B4-BE49-F238E27FC236}">
+                <a16:creationId xmlns:a16="http://schemas.microsoft.com/office/drawing/2014/main" id="{1B8C1DB5-884B-4388-89FE-F0D04C179C55}"/>
+              </a:ext>
+            </a:extLst>
+          </p:cNvPr>
+          <p:cNvSpPr/>
+          <p:nvPr/>
+        </p:nvSpPr>
+        <p:spPr>
+          <a:xfrm>
+            <a:off x="1572837" y="4953662"/>
+            <a:ext cx="6454401" cy="660687"/>
+          </a:xfrm>
+          <a:prstGeom prst="rect">
+            <a:avLst/>
+          </a:prstGeom>
+          <a:noFill/>
+          <a:ln>
+            <a:solidFill>
+              <a:schemeClr val="tx1"/>
+            </a:solidFill>
+          </a:ln>
+        </p:spPr>
+        <p:style>
+          <a:lnRef idx="2">
+            <a:schemeClr val="accent1">
+              <a:shade val="50000"/>
+            </a:schemeClr>
+          </a:lnRef>
+          <a:fillRef idx="1">
+            <a:schemeClr val="accent1"/>
+          </a:fillRef>
+          <a:effectRef idx="0">
+            <a:schemeClr val="accent1"/>
+          </a:effectRef>
+          <a:fontRef idx="minor">
+            <a:schemeClr val="lt1"/>
+          </a:fontRef>
+        </p:style>
+        <p:txBody>
+          <a:bodyPr rtlCol="0" anchor="ctr"/>
+          <a:lstStyle/>
+          <a:p>
+            <a:pPr algn="ctr"/>
+            <a:endParaRPr lang="en-US" sz="1201" dirty="0"/>
+          </a:p>
+        </p:txBody>
+      </p:sp>
+      <p:cxnSp>
+        <p:nvCxnSpPr>
+          <p:cNvPr id="5" name="Straight Connector 4">
+            <a:extLst>
+              <a:ext uri="{FF2B5EF4-FFF2-40B4-BE49-F238E27FC236}">
+                <a16:creationId xmlns:a16="http://schemas.microsoft.com/office/drawing/2014/main" id="{21839EEE-8729-49DE-AC3A-53B0B3FC046D}"/>
+              </a:ext>
+            </a:extLst>
+          </p:cNvPr>
+          <p:cNvCxnSpPr>
+            <a:cxnSpLocks/>
+          </p:cNvCxnSpPr>
+          <p:nvPr/>
+        </p:nvCxnSpPr>
+        <p:spPr>
+          <a:xfrm>
+            <a:off x="2741744" y="4953662"/>
+            <a:ext cx="0" cy="660687"/>
+          </a:xfrm>
+          <a:prstGeom prst="line">
+            <a:avLst/>
+          </a:prstGeom>
+          <a:ln>
+            <a:solidFill>
+              <a:schemeClr val="tx1"/>
+            </a:solidFill>
+          </a:ln>
+        </p:spPr>
+        <p:style>
+          <a:lnRef idx="1">
+            <a:schemeClr val="accent1"/>
+          </a:lnRef>
+          <a:fillRef idx="0">
+            <a:schemeClr val="accent1"/>
+          </a:fillRef>
+          <a:effectRef idx="0">
+            <a:schemeClr val="accent1"/>
+          </a:effectRef>
+          <a:fontRef idx="minor">
+            <a:schemeClr val="tx1"/>
+          </a:fontRef>
+        </p:style>
+      </p:cxnSp>
+      <p:cxnSp>
+        <p:nvCxnSpPr>
+          <p:cNvPr id="9" name="Straight Connector 8">
+            <a:extLst>
+              <a:ext uri="{FF2B5EF4-FFF2-40B4-BE49-F238E27FC236}">
+                <a16:creationId xmlns:a16="http://schemas.microsoft.com/office/drawing/2014/main" id="{B46DBD1D-705E-42E0-A395-41AE7F758A90}"/>
+              </a:ext>
+            </a:extLst>
+          </p:cNvPr>
+          <p:cNvCxnSpPr>
+            <a:cxnSpLocks/>
+          </p:cNvCxnSpPr>
+          <p:nvPr/>
+        </p:nvCxnSpPr>
+        <p:spPr>
+          <a:xfrm>
+            <a:off x="3859829" y="4953662"/>
+            <a:ext cx="0" cy="660687"/>
+          </a:xfrm>
+          <a:prstGeom prst="line">
+            <a:avLst/>
+          </a:prstGeom>
+          <a:ln>
+            <a:solidFill>
+              <a:schemeClr val="tx1"/>
+            </a:solidFill>
+          </a:ln>
+        </p:spPr>
+        <p:style>
+          <a:lnRef idx="1">
+            <a:schemeClr val="accent1"/>
+          </a:lnRef>
+          <a:fillRef idx="0">
+            <a:schemeClr val="accent1"/>
+          </a:fillRef>
+          <a:effectRef idx="0">
+            <a:schemeClr val="accent1"/>
+          </a:effectRef>
+          <a:fontRef idx="minor">
+            <a:schemeClr val="tx1"/>
+          </a:fontRef>
+        </p:style>
+      </p:cxnSp>
+      <p:cxnSp>
+        <p:nvCxnSpPr>
+          <p:cNvPr id="10" name="Straight Connector 9">
+            <a:extLst>
+              <a:ext uri="{FF2B5EF4-FFF2-40B4-BE49-F238E27FC236}">
+                <a16:creationId xmlns:a16="http://schemas.microsoft.com/office/drawing/2014/main" id="{00BB71C5-1547-446D-974F-E26CBD73EE12}"/>
+              </a:ext>
+            </a:extLst>
+          </p:cNvPr>
+          <p:cNvCxnSpPr>
+            <a:cxnSpLocks/>
+          </p:cNvCxnSpPr>
+          <p:nvPr/>
+        </p:nvCxnSpPr>
+        <p:spPr>
+          <a:xfrm>
+            <a:off x="4876271" y="4953662"/>
+            <a:ext cx="0" cy="660687"/>
+          </a:xfrm>
+          <a:prstGeom prst="line">
+            <a:avLst/>
+          </a:prstGeom>
+          <a:ln>
+            <a:solidFill>
+              <a:schemeClr val="tx1"/>
+            </a:solidFill>
+          </a:ln>
+        </p:spPr>
+        <p:style>
+          <a:lnRef idx="1">
+            <a:schemeClr val="accent1"/>
+          </a:lnRef>
+          <a:fillRef idx="0">
+            <a:schemeClr val="accent1"/>
+          </a:fillRef>
+          <a:effectRef idx="0">
+            <a:schemeClr val="accent1"/>
+          </a:effectRef>
+          <a:fontRef idx="minor">
+            <a:schemeClr val="tx1"/>
+          </a:fontRef>
+        </p:style>
+      </p:cxnSp>
+      <p:cxnSp>
+        <p:nvCxnSpPr>
+          <p:cNvPr id="11" name="Straight Connector 10">
+            <a:extLst>
+              <a:ext uri="{FF2B5EF4-FFF2-40B4-BE49-F238E27FC236}">
+                <a16:creationId xmlns:a16="http://schemas.microsoft.com/office/drawing/2014/main" id="{F9B97227-F431-4408-8049-204C11CA68BC}"/>
+              </a:ext>
+            </a:extLst>
+          </p:cNvPr>
+          <p:cNvCxnSpPr>
+            <a:cxnSpLocks/>
+          </p:cNvCxnSpPr>
+          <p:nvPr/>
+        </p:nvCxnSpPr>
+        <p:spPr>
+          <a:xfrm>
+            <a:off x="5994356" y="4953662"/>
+            <a:ext cx="0" cy="660687"/>
+          </a:xfrm>
+          <a:prstGeom prst="line">
+            <a:avLst/>
+          </a:prstGeom>
+          <a:ln>
+            <a:solidFill>
+              <a:schemeClr val="tx1"/>
+            </a:solidFill>
+          </a:ln>
+        </p:spPr>
+        <p:style>
+          <a:lnRef idx="1">
+            <a:schemeClr val="accent1"/>
+          </a:lnRef>
+          <a:fillRef idx="0">
+            <a:schemeClr val="accent1"/>
+          </a:fillRef>
+          <a:effectRef idx="0">
+            <a:schemeClr val="accent1"/>
+          </a:effectRef>
+          <a:fontRef idx="minor">
+            <a:schemeClr val="tx1"/>
+          </a:fontRef>
+        </p:style>
+      </p:cxnSp>
+      <p:cxnSp>
+        <p:nvCxnSpPr>
+          <p:cNvPr id="12" name="Straight Connector 11">
+            <a:extLst>
+              <a:ext uri="{FF2B5EF4-FFF2-40B4-BE49-F238E27FC236}">
+                <a16:creationId xmlns:a16="http://schemas.microsoft.com/office/drawing/2014/main" id="{4BBFB6DD-CF5A-4896-A393-0CFC9A318B74}"/>
+              </a:ext>
+            </a:extLst>
+          </p:cNvPr>
+          <p:cNvCxnSpPr>
+            <a:cxnSpLocks/>
+          </p:cNvCxnSpPr>
+          <p:nvPr/>
+        </p:nvCxnSpPr>
+        <p:spPr>
+          <a:xfrm>
+            <a:off x="7010797" y="4953662"/>
+            <a:ext cx="0" cy="660687"/>
+          </a:xfrm>
+          <a:prstGeom prst="line">
+            <a:avLst/>
+          </a:prstGeom>
+          <a:ln>
+            <a:solidFill>
+              <a:schemeClr val="tx1"/>
+            </a:solidFill>
+          </a:ln>
+        </p:spPr>
+        <p:style>
+          <a:lnRef idx="1">
+            <a:schemeClr val="accent1"/>
+          </a:lnRef>
+          <a:fillRef idx="0">
+            <a:schemeClr val="accent1"/>
+          </a:fillRef>
+          <a:effectRef idx="0">
+            <a:schemeClr val="accent1"/>
+          </a:effectRef>
+          <a:fontRef idx="minor">
+            <a:schemeClr val="tx1"/>
+          </a:fontRef>
+        </p:style>
+      </p:cxnSp>
+      <p:cxnSp>
+        <p:nvCxnSpPr>
+          <p:cNvPr id="13" name="Straight Connector 12">
+            <a:extLst>
+              <a:ext uri="{FF2B5EF4-FFF2-40B4-BE49-F238E27FC236}">
+                <a16:creationId xmlns:a16="http://schemas.microsoft.com/office/drawing/2014/main" id="{ACE08983-F04A-4B8E-883C-C2E8FA2B11B0}"/>
+              </a:ext>
+            </a:extLst>
+          </p:cNvPr>
+          <p:cNvCxnSpPr>
+            <a:cxnSpLocks/>
+          </p:cNvCxnSpPr>
+          <p:nvPr/>
+        </p:nvCxnSpPr>
+        <p:spPr>
+          <a:xfrm>
+            <a:off x="8027238" y="4953662"/>
+            <a:ext cx="0" cy="660687"/>
+          </a:xfrm>
+          <a:prstGeom prst="line">
+            <a:avLst/>
+          </a:prstGeom>
+          <a:ln>
+            <a:solidFill>
+              <a:schemeClr val="tx1"/>
+            </a:solidFill>
+          </a:ln>
+        </p:spPr>
+        <p:style>
+          <a:lnRef idx="1">
+            <a:schemeClr val="accent1"/>
+          </a:lnRef>
+          <a:fillRef idx="0">
+            <a:schemeClr val="accent1"/>
+          </a:fillRef>
+          <a:effectRef idx="0">
+            <a:schemeClr val="accent1"/>
+          </a:effectRef>
+          <a:fontRef idx="minor">
+            <a:schemeClr val="tx1"/>
+          </a:fontRef>
+        </p:style>
+      </p:cxnSp>
+      <p:sp>
+        <p:nvSpPr>
+          <p:cNvPr id="7" name="TextBox 6">
+            <a:extLst>
+              <a:ext uri="{FF2B5EF4-FFF2-40B4-BE49-F238E27FC236}">
+                <a16:creationId xmlns:a16="http://schemas.microsoft.com/office/drawing/2014/main" id="{FEA8926C-CA96-46F0-9EC2-E33DAF24E45A}"/>
+              </a:ext>
+            </a:extLst>
+          </p:cNvPr>
+          <p:cNvSpPr txBox="1"/>
+          <p:nvPr/>
+        </p:nvSpPr>
+        <p:spPr>
+          <a:xfrm>
+            <a:off x="1750715" y="5109566"/>
+            <a:ext cx="863975" cy="338554"/>
+          </a:xfrm>
+          <a:prstGeom prst="rect">
+            <a:avLst/>
+          </a:prstGeom>
+          <a:noFill/>
+        </p:spPr>
+        <p:txBody>
+          <a:bodyPr wrap="square" rtlCol="0">
+            <a:spAutoFit/>
+          </a:bodyPr>
+          <a:lstStyle/>
+          <a:p>
+            <a:r>
+              <a:rPr lang="en-US" sz="1600" dirty="0"/>
+              <a:t>Item1</a:t>
+            </a:r>
+          </a:p>
+        </p:txBody>
+      </p:sp>
+      <p:sp>
+        <p:nvSpPr>
+          <p:cNvPr id="15" name="TextBox 14">
+            <a:extLst>
+              <a:ext uri="{FF2B5EF4-FFF2-40B4-BE49-F238E27FC236}">
+                <a16:creationId xmlns:a16="http://schemas.microsoft.com/office/drawing/2014/main" id="{2AC2F643-3AE7-4C3E-9159-5F2758B0F774}"/>
+              </a:ext>
+            </a:extLst>
+          </p:cNvPr>
+          <p:cNvSpPr txBox="1"/>
+          <p:nvPr/>
+        </p:nvSpPr>
+        <p:spPr>
+          <a:xfrm>
+            <a:off x="2868799" y="5109566"/>
+            <a:ext cx="863975" cy="338554"/>
+          </a:xfrm>
+          <a:prstGeom prst="rect">
+            <a:avLst/>
+          </a:prstGeom>
+          <a:noFill/>
+        </p:spPr>
+        <p:txBody>
+          <a:bodyPr wrap="square" rtlCol="0">
+            <a:spAutoFit/>
+          </a:bodyPr>
+          <a:lstStyle/>
+          <a:p>
+            <a:r>
+              <a:rPr lang="en-US" sz="1600" dirty="0"/>
+              <a:t>Item2</a:t>
+            </a:r>
+          </a:p>
+        </p:txBody>
+      </p:sp>
+      <p:sp>
+        <p:nvSpPr>
+          <p:cNvPr id="16" name="TextBox 15">
+            <a:extLst>
+              <a:ext uri="{FF2B5EF4-FFF2-40B4-BE49-F238E27FC236}">
+                <a16:creationId xmlns:a16="http://schemas.microsoft.com/office/drawing/2014/main" id="{3939956F-5601-4F38-B2B1-1F35C3DC41AA}"/>
+              </a:ext>
+            </a:extLst>
+          </p:cNvPr>
+          <p:cNvSpPr txBox="1"/>
+          <p:nvPr/>
+        </p:nvSpPr>
+        <p:spPr>
+          <a:xfrm>
+            <a:off x="3986884" y="5109566"/>
+            <a:ext cx="863975" cy="338554"/>
+          </a:xfrm>
+          <a:prstGeom prst="rect">
+            <a:avLst/>
+          </a:prstGeom>
+          <a:noFill/>
+        </p:spPr>
+        <p:txBody>
+          <a:bodyPr wrap="square" rtlCol="0">
+            <a:spAutoFit/>
+          </a:bodyPr>
+          <a:lstStyle/>
+          <a:p>
+            <a:r>
+              <a:rPr lang="en-US" sz="1600" dirty="0"/>
+              <a:t>Item3</a:t>
+            </a:r>
+          </a:p>
+        </p:txBody>
+      </p:sp>
+      <p:sp>
+        <p:nvSpPr>
+          <p:cNvPr id="17" name="TextBox 16">
+            <a:extLst>
+              <a:ext uri="{FF2B5EF4-FFF2-40B4-BE49-F238E27FC236}">
+                <a16:creationId xmlns:a16="http://schemas.microsoft.com/office/drawing/2014/main" id="{4C306127-6333-4619-A88F-1CB2C533E504}"/>
+              </a:ext>
+            </a:extLst>
+          </p:cNvPr>
+          <p:cNvSpPr txBox="1"/>
+          <p:nvPr/>
+        </p:nvSpPr>
+        <p:spPr>
+          <a:xfrm>
+            <a:off x="5052280" y="5109566"/>
+            <a:ext cx="863975" cy="338554"/>
+          </a:xfrm>
+          <a:prstGeom prst="rect">
+            <a:avLst/>
+          </a:prstGeom>
+          <a:noFill/>
+        </p:spPr>
+        <p:txBody>
+          <a:bodyPr wrap="square" rtlCol="0">
+            <a:spAutoFit/>
+          </a:bodyPr>
+          <a:lstStyle/>
+          <a:p>
+            <a:r>
+              <a:rPr lang="en-US" sz="1600" dirty="0"/>
+              <a:t>Item4</a:t>
+            </a:r>
+          </a:p>
+        </p:txBody>
+      </p:sp>
+      <p:sp>
+        <p:nvSpPr>
+          <p:cNvPr id="18" name="TextBox 17">
+            <a:extLst>
+              <a:ext uri="{FF2B5EF4-FFF2-40B4-BE49-F238E27FC236}">
+                <a16:creationId xmlns:a16="http://schemas.microsoft.com/office/drawing/2014/main" id="{CD8D9C7C-EC18-4406-A021-74FC63048D68}"/>
+              </a:ext>
+            </a:extLst>
+          </p:cNvPr>
+          <p:cNvSpPr txBox="1"/>
+          <p:nvPr/>
+        </p:nvSpPr>
+        <p:spPr>
+          <a:xfrm>
+            <a:off x="6070972" y="5109566"/>
+            <a:ext cx="863975" cy="338554"/>
+          </a:xfrm>
+          <a:prstGeom prst="rect">
+            <a:avLst/>
+          </a:prstGeom>
+          <a:noFill/>
+        </p:spPr>
+        <p:txBody>
+          <a:bodyPr wrap="square" rtlCol="0">
+            <a:spAutoFit/>
+          </a:bodyPr>
+          <a:lstStyle/>
+          <a:p>
+            <a:r>
+              <a:rPr lang="en-US" sz="1600" dirty="0"/>
+              <a:t>Item5</a:t>
+            </a:r>
+          </a:p>
+        </p:txBody>
+      </p:sp>
+      <p:sp>
+        <p:nvSpPr>
+          <p:cNvPr id="19" name="TextBox 18">
+            <a:extLst>
+              <a:ext uri="{FF2B5EF4-FFF2-40B4-BE49-F238E27FC236}">
+                <a16:creationId xmlns:a16="http://schemas.microsoft.com/office/drawing/2014/main" id="{D014521F-232A-41AF-96CB-08C55CEBABBC}"/>
+              </a:ext>
+            </a:extLst>
+          </p:cNvPr>
+          <p:cNvSpPr txBox="1"/>
+          <p:nvPr/>
+        </p:nvSpPr>
+        <p:spPr>
+          <a:xfrm>
+            <a:off x="7086647" y="5109566"/>
+            <a:ext cx="863975" cy="338554"/>
+          </a:xfrm>
+          <a:prstGeom prst="rect">
+            <a:avLst/>
+          </a:prstGeom>
+          <a:noFill/>
+        </p:spPr>
+        <p:txBody>
+          <a:bodyPr wrap="square" rtlCol="0">
+            <a:spAutoFit/>
+          </a:bodyPr>
+          <a:lstStyle/>
+          <a:p>
+            <a:r>
+              <a:rPr lang="en-US" sz="1600" dirty="0"/>
+              <a:t>Item6</a:t>
+            </a:r>
+          </a:p>
+        </p:txBody>
+      </p:sp>
+    </p:spTree>
+    <p:extLst>
+      <p:ext uri="{BB962C8B-B14F-4D97-AF65-F5344CB8AC3E}">
+        <p14:creationId xmlns:p14="http://schemas.microsoft.com/office/powerpoint/2010/main" val="2688681558"/>
+      </p:ext>
+    </p:extLst>
+  </p:cSld>
+  <p:clrMapOvr>
+    <a:masterClrMapping/>
+  </p:clrMapOvr>
+</p:sld>
+</file>
+
+<file path=ppt/slides/slide40.xml><?xml version="1.0" encoding="utf-8"?>
 <p:sld xmlns:a="http://schemas.openxmlformats.org/drawingml/2006/main" xmlns:r="http://schemas.openxmlformats.org/officeDocument/2006/relationships" xmlns:p="http://schemas.openxmlformats.org/presentationml/2006/main">
   <p:cSld>
     <p:spTree>
@@ -42045,626 +42915,7 @@
 </p:sld>
 </file>
 
-<file path=ppt/slides/slide4.xml><?xml version="1.0" encoding="utf-8"?>
-<p:sld xmlns:a="http://schemas.openxmlformats.org/drawingml/2006/main" xmlns:r="http://schemas.openxmlformats.org/officeDocument/2006/relationships" xmlns:p="http://schemas.openxmlformats.org/presentationml/2006/main">
-  <p:cSld>
-    <p:spTree>
-      <p:nvGrpSpPr>
-        <p:cNvPr id="1" name="Shape 211"/>
-        <p:cNvGrpSpPr/>
-        <p:nvPr/>
-      </p:nvGrpSpPr>
-      <p:grpSpPr>
-        <a:xfrm>
-          <a:off x="0" y="0"/>
-          <a:ext cx="0" cy="0"/>
-          <a:chOff x="0" y="0"/>
-          <a:chExt cx="0" cy="0"/>
-        </a:xfrm>
-      </p:grpSpPr>
-      <p:sp>
-        <p:nvSpPr>
-          <p:cNvPr id="212" name="Shape 212"/>
-          <p:cNvSpPr txBox="1">
-            <a:spLocks noGrp="1"/>
-          </p:cNvSpPr>
-          <p:nvPr>
-            <p:ph type="title"/>
-          </p:nvPr>
-        </p:nvSpPr>
-        <p:spPr/>
-        <p:txBody>
-          <a:bodyPr/>
-          <a:lstStyle/>
-          <a:p>
-            <a:r>
-              <a:rPr lang="en-US"/>
-              <a:t>Array </a:t>
-            </a:r>
-            <a:endParaRPr lang="en-US" dirty="0"/>
-          </a:p>
-        </p:txBody>
-      </p:sp>
-      <p:sp>
-        <p:nvSpPr>
-          <p:cNvPr id="213" name="Shape 213"/>
-          <p:cNvSpPr txBox="1">
-            <a:spLocks noGrp="1"/>
-          </p:cNvSpPr>
-          <p:nvPr>
-            <p:ph sz="quarter" idx="10"/>
-          </p:nvPr>
-        </p:nvSpPr>
-        <p:spPr/>
-        <p:txBody>
-          <a:bodyPr/>
-          <a:lstStyle/>
-          <a:p>
-            <a:r>
-              <a:rPr lang="en-US" dirty="0"/>
-              <a:t>Very effective in terms of memory</a:t>
-            </a:r>
-          </a:p>
-          <a:p>
-            <a:r>
-              <a:rPr lang="en-US" dirty="0"/>
-              <a:t>Items are stored in a single block right next to each other </a:t>
-            </a:r>
-          </a:p>
-          <a:p>
-            <a:r>
-              <a:rPr lang="en-US" dirty="0"/>
-              <a:t>Accessing elements: very fast</a:t>
-            </a:r>
-          </a:p>
-          <a:p>
-            <a:r>
-              <a:rPr lang="en-US" dirty="0"/>
-              <a:t>Fixed size, you cannot add/remove items</a:t>
-            </a:r>
-          </a:p>
-          <a:p>
-            <a:r>
-              <a:rPr lang="en-US" dirty="0"/>
-              <a:t>Searching an item in an array: O(N)</a:t>
-            </a:r>
-          </a:p>
-        </p:txBody>
-      </p:sp>
-      <p:sp>
-        <p:nvSpPr>
-          <p:cNvPr id="3" name="Rectangle 2">
-            <a:extLst>
-              <a:ext uri="{FF2B5EF4-FFF2-40B4-BE49-F238E27FC236}">
-                <a16:creationId xmlns:a16="http://schemas.microsoft.com/office/drawing/2014/main" id="{1B8C1DB5-884B-4388-89FE-F0D04C179C55}"/>
-              </a:ext>
-            </a:extLst>
-          </p:cNvPr>
-          <p:cNvSpPr/>
-          <p:nvPr/>
-        </p:nvSpPr>
-        <p:spPr>
-          <a:xfrm>
-            <a:off x="1572837" y="4953662"/>
-            <a:ext cx="6454401" cy="660687"/>
-          </a:xfrm>
-          <a:prstGeom prst="rect">
-            <a:avLst/>
-          </a:prstGeom>
-          <a:noFill/>
-          <a:ln>
-            <a:solidFill>
-              <a:schemeClr val="tx1"/>
-            </a:solidFill>
-          </a:ln>
-        </p:spPr>
-        <p:style>
-          <a:lnRef idx="2">
-            <a:schemeClr val="accent1">
-              <a:shade val="50000"/>
-            </a:schemeClr>
-          </a:lnRef>
-          <a:fillRef idx="1">
-            <a:schemeClr val="accent1"/>
-          </a:fillRef>
-          <a:effectRef idx="0">
-            <a:schemeClr val="accent1"/>
-          </a:effectRef>
-          <a:fontRef idx="minor">
-            <a:schemeClr val="lt1"/>
-          </a:fontRef>
-        </p:style>
-        <p:txBody>
-          <a:bodyPr rtlCol="0" anchor="ctr"/>
-          <a:lstStyle/>
-          <a:p>
-            <a:pPr algn="ctr"/>
-            <a:endParaRPr lang="en-US" sz="1201" dirty="0"/>
-          </a:p>
-        </p:txBody>
-      </p:sp>
-      <p:cxnSp>
-        <p:nvCxnSpPr>
-          <p:cNvPr id="5" name="Straight Connector 4">
-            <a:extLst>
-              <a:ext uri="{FF2B5EF4-FFF2-40B4-BE49-F238E27FC236}">
-                <a16:creationId xmlns:a16="http://schemas.microsoft.com/office/drawing/2014/main" id="{21839EEE-8729-49DE-AC3A-53B0B3FC046D}"/>
-              </a:ext>
-            </a:extLst>
-          </p:cNvPr>
-          <p:cNvCxnSpPr>
-            <a:cxnSpLocks/>
-          </p:cNvCxnSpPr>
-          <p:nvPr/>
-        </p:nvCxnSpPr>
-        <p:spPr>
-          <a:xfrm>
-            <a:off x="2741744" y="4953662"/>
-            <a:ext cx="0" cy="660687"/>
-          </a:xfrm>
-          <a:prstGeom prst="line">
-            <a:avLst/>
-          </a:prstGeom>
-          <a:ln>
-            <a:solidFill>
-              <a:schemeClr val="tx1"/>
-            </a:solidFill>
-          </a:ln>
-        </p:spPr>
-        <p:style>
-          <a:lnRef idx="1">
-            <a:schemeClr val="accent1"/>
-          </a:lnRef>
-          <a:fillRef idx="0">
-            <a:schemeClr val="accent1"/>
-          </a:fillRef>
-          <a:effectRef idx="0">
-            <a:schemeClr val="accent1"/>
-          </a:effectRef>
-          <a:fontRef idx="minor">
-            <a:schemeClr val="tx1"/>
-          </a:fontRef>
-        </p:style>
-      </p:cxnSp>
-      <p:cxnSp>
-        <p:nvCxnSpPr>
-          <p:cNvPr id="9" name="Straight Connector 8">
-            <a:extLst>
-              <a:ext uri="{FF2B5EF4-FFF2-40B4-BE49-F238E27FC236}">
-                <a16:creationId xmlns:a16="http://schemas.microsoft.com/office/drawing/2014/main" id="{B46DBD1D-705E-42E0-A395-41AE7F758A90}"/>
-              </a:ext>
-            </a:extLst>
-          </p:cNvPr>
-          <p:cNvCxnSpPr>
-            <a:cxnSpLocks/>
-          </p:cNvCxnSpPr>
-          <p:nvPr/>
-        </p:nvCxnSpPr>
-        <p:spPr>
-          <a:xfrm>
-            <a:off x="3859829" y="4953662"/>
-            <a:ext cx="0" cy="660687"/>
-          </a:xfrm>
-          <a:prstGeom prst="line">
-            <a:avLst/>
-          </a:prstGeom>
-          <a:ln>
-            <a:solidFill>
-              <a:schemeClr val="tx1"/>
-            </a:solidFill>
-          </a:ln>
-        </p:spPr>
-        <p:style>
-          <a:lnRef idx="1">
-            <a:schemeClr val="accent1"/>
-          </a:lnRef>
-          <a:fillRef idx="0">
-            <a:schemeClr val="accent1"/>
-          </a:fillRef>
-          <a:effectRef idx="0">
-            <a:schemeClr val="accent1"/>
-          </a:effectRef>
-          <a:fontRef idx="minor">
-            <a:schemeClr val="tx1"/>
-          </a:fontRef>
-        </p:style>
-      </p:cxnSp>
-      <p:cxnSp>
-        <p:nvCxnSpPr>
-          <p:cNvPr id="10" name="Straight Connector 9">
-            <a:extLst>
-              <a:ext uri="{FF2B5EF4-FFF2-40B4-BE49-F238E27FC236}">
-                <a16:creationId xmlns:a16="http://schemas.microsoft.com/office/drawing/2014/main" id="{00BB71C5-1547-446D-974F-E26CBD73EE12}"/>
-              </a:ext>
-            </a:extLst>
-          </p:cNvPr>
-          <p:cNvCxnSpPr>
-            <a:cxnSpLocks/>
-          </p:cNvCxnSpPr>
-          <p:nvPr/>
-        </p:nvCxnSpPr>
-        <p:spPr>
-          <a:xfrm>
-            <a:off x="4876271" y="4953662"/>
-            <a:ext cx="0" cy="660687"/>
-          </a:xfrm>
-          <a:prstGeom prst="line">
-            <a:avLst/>
-          </a:prstGeom>
-          <a:ln>
-            <a:solidFill>
-              <a:schemeClr val="tx1"/>
-            </a:solidFill>
-          </a:ln>
-        </p:spPr>
-        <p:style>
-          <a:lnRef idx="1">
-            <a:schemeClr val="accent1"/>
-          </a:lnRef>
-          <a:fillRef idx="0">
-            <a:schemeClr val="accent1"/>
-          </a:fillRef>
-          <a:effectRef idx="0">
-            <a:schemeClr val="accent1"/>
-          </a:effectRef>
-          <a:fontRef idx="minor">
-            <a:schemeClr val="tx1"/>
-          </a:fontRef>
-        </p:style>
-      </p:cxnSp>
-      <p:cxnSp>
-        <p:nvCxnSpPr>
-          <p:cNvPr id="11" name="Straight Connector 10">
-            <a:extLst>
-              <a:ext uri="{FF2B5EF4-FFF2-40B4-BE49-F238E27FC236}">
-                <a16:creationId xmlns:a16="http://schemas.microsoft.com/office/drawing/2014/main" id="{F9B97227-F431-4408-8049-204C11CA68BC}"/>
-              </a:ext>
-            </a:extLst>
-          </p:cNvPr>
-          <p:cNvCxnSpPr>
-            <a:cxnSpLocks/>
-          </p:cNvCxnSpPr>
-          <p:nvPr/>
-        </p:nvCxnSpPr>
-        <p:spPr>
-          <a:xfrm>
-            <a:off x="5994356" y="4953662"/>
-            <a:ext cx="0" cy="660687"/>
-          </a:xfrm>
-          <a:prstGeom prst="line">
-            <a:avLst/>
-          </a:prstGeom>
-          <a:ln>
-            <a:solidFill>
-              <a:schemeClr val="tx1"/>
-            </a:solidFill>
-          </a:ln>
-        </p:spPr>
-        <p:style>
-          <a:lnRef idx="1">
-            <a:schemeClr val="accent1"/>
-          </a:lnRef>
-          <a:fillRef idx="0">
-            <a:schemeClr val="accent1"/>
-          </a:fillRef>
-          <a:effectRef idx="0">
-            <a:schemeClr val="accent1"/>
-          </a:effectRef>
-          <a:fontRef idx="minor">
-            <a:schemeClr val="tx1"/>
-          </a:fontRef>
-        </p:style>
-      </p:cxnSp>
-      <p:cxnSp>
-        <p:nvCxnSpPr>
-          <p:cNvPr id="12" name="Straight Connector 11">
-            <a:extLst>
-              <a:ext uri="{FF2B5EF4-FFF2-40B4-BE49-F238E27FC236}">
-                <a16:creationId xmlns:a16="http://schemas.microsoft.com/office/drawing/2014/main" id="{4BBFB6DD-CF5A-4896-A393-0CFC9A318B74}"/>
-              </a:ext>
-            </a:extLst>
-          </p:cNvPr>
-          <p:cNvCxnSpPr>
-            <a:cxnSpLocks/>
-          </p:cNvCxnSpPr>
-          <p:nvPr/>
-        </p:nvCxnSpPr>
-        <p:spPr>
-          <a:xfrm>
-            <a:off x="7010797" y="4953662"/>
-            <a:ext cx="0" cy="660687"/>
-          </a:xfrm>
-          <a:prstGeom prst="line">
-            <a:avLst/>
-          </a:prstGeom>
-          <a:ln>
-            <a:solidFill>
-              <a:schemeClr val="tx1"/>
-            </a:solidFill>
-          </a:ln>
-        </p:spPr>
-        <p:style>
-          <a:lnRef idx="1">
-            <a:schemeClr val="accent1"/>
-          </a:lnRef>
-          <a:fillRef idx="0">
-            <a:schemeClr val="accent1"/>
-          </a:fillRef>
-          <a:effectRef idx="0">
-            <a:schemeClr val="accent1"/>
-          </a:effectRef>
-          <a:fontRef idx="minor">
-            <a:schemeClr val="tx1"/>
-          </a:fontRef>
-        </p:style>
-      </p:cxnSp>
-      <p:cxnSp>
-        <p:nvCxnSpPr>
-          <p:cNvPr id="13" name="Straight Connector 12">
-            <a:extLst>
-              <a:ext uri="{FF2B5EF4-FFF2-40B4-BE49-F238E27FC236}">
-                <a16:creationId xmlns:a16="http://schemas.microsoft.com/office/drawing/2014/main" id="{ACE08983-F04A-4B8E-883C-C2E8FA2B11B0}"/>
-              </a:ext>
-            </a:extLst>
-          </p:cNvPr>
-          <p:cNvCxnSpPr>
-            <a:cxnSpLocks/>
-          </p:cNvCxnSpPr>
-          <p:nvPr/>
-        </p:nvCxnSpPr>
-        <p:spPr>
-          <a:xfrm>
-            <a:off x="8027238" y="4953662"/>
-            <a:ext cx="0" cy="660687"/>
-          </a:xfrm>
-          <a:prstGeom prst="line">
-            <a:avLst/>
-          </a:prstGeom>
-          <a:ln>
-            <a:solidFill>
-              <a:schemeClr val="tx1"/>
-            </a:solidFill>
-          </a:ln>
-        </p:spPr>
-        <p:style>
-          <a:lnRef idx="1">
-            <a:schemeClr val="accent1"/>
-          </a:lnRef>
-          <a:fillRef idx="0">
-            <a:schemeClr val="accent1"/>
-          </a:fillRef>
-          <a:effectRef idx="0">
-            <a:schemeClr val="accent1"/>
-          </a:effectRef>
-          <a:fontRef idx="minor">
-            <a:schemeClr val="tx1"/>
-          </a:fontRef>
-        </p:style>
-      </p:cxnSp>
-      <p:sp>
-        <p:nvSpPr>
-          <p:cNvPr id="7" name="TextBox 6">
-            <a:extLst>
-              <a:ext uri="{FF2B5EF4-FFF2-40B4-BE49-F238E27FC236}">
-                <a16:creationId xmlns:a16="http://schemas.microsoft.com/office/drawing/2014/main" id="{FEA8926C-CA96-46F0-9EC2-E33DAF24E45A}"/>
-              </a:ext>
-            </a:extLst>
-          </p:cNvPr>
-          <p:cNvSpPr txBox="1"/>
-          <p:nvPr/>
-        </p:nvSpPr>
-        <p:spPr>
-          <a:xfrm>
-            <a:off x="1750715" y="5109566"/>
-            <a:ext cx="863975" cy="338554"/>
-          </a:xfrm>
-          <a:prstGeom prst="rect">
-            <a:avLst/>
-          </a:prstGeom>
-          <a:noFill/>
-        </p:spPr>
-        <p:txBody>
-          <a:bodyPr wrap="square" rtlCol="0">
-            <a:spAutoFit/>
-          </a:bodyPr>
-          <a:lstStyle/>
-          <a:p>
-            <a:r>
-              <a:rPr lang="en-US" sz="1600" dirty="0"/>
-              <a:t>Item1</a:t>
-            </a:r>
-          </a:p>
-        </p:txBody>
-      </p:sp>
-      <p:sp>
-        <p:nvSpPr>
-          <p:cNvPr id="15" name="TextBox 14">
-            <a:extLst>
-              <a:ext uri="{FF2B5EF4-FFF2-40B4-BE49-F238E27FC236}">
-                <a16:creationId xmlns:a16="http://schemas.microsoft.com/office/drawing/2014/main" id="{2AC2F643-3AE7-4C3E-9159-5F2758B0F774}"/>
-              </a:ext>
-            </a:extLst>
-          </p:cNvPr>
-          <p:cNvSpPr txBox="1"/>
-          <p:nvPr/>
-        </p:nvSpPr>
-        <p:spPr>
-          <a:xfrm>
-            <a:off x="2868799" y="5109566"/>
-            <a:ext cx="863975" cy="338554"/>
-          </a:xfrm>
-          <a:prstGeom prst="rect">
-            <a:avLst/>
-          </a:prstGeom>
-          <a:noFill/>
-        </p:spPr>
-        <p:txBody>
-          <a:bodyPr wrap="square" rtlCol="0">
-            <a:spAutoFit/>
-          </a:bodyPr>
-          <a:lstStyle/>
-          <a:p>
-            <a:r>
-              <a:rPr lang="en-US" sz="1600" dirty="0"/>
-              <a:t>Item2</a:t>
-            </a:r>
-          </a:p>
-        </p:txBody>
-      </p:sp>
-      <p:sp>
-        <p:nvSpPr>
-          <p:cNvPr id="16" name="TextBox 15">
-            <a:extLst>
-              <a:ext uri="{FF2B5EF4-FFF2-40B4-BE49-F238E27FC236}">
-                <a16:creationId xmlns:a16="http://schemas.microsoft.com/office/drawing/2014/main" id="{3939956F-5601-4F38-B2B1-1F35C3DC41AA}"/>
-              </a:ext>
-            </a:extLst>
-          </p:cNvPr>
-          <p:cNvSpPr txBox="1"/>
-          <p:nvPr/>
-        </p:nvSpPr>
-        <p:spPr>
-          <a:xfrm>
-            <a:off x="3986884" y="5109566"/>
-            <a:ext cx="863975" cy="338554"/>
-          </a:xfrm>
-          <a:prstGeom prst="rect">
-            <a:avLst/>
-          </a:prstGeom>
-          <a:noFill/>
-        </p:spPr>
-        <p:txBody>
-          <a:bodyPr wrap="square" rtlCol="0">
-            <a:spAutoFit/>
-          </a:bodyPr>
-          <a:lstStyle/>
-          <a:p>
-            <a:r>
-              <a:rPr lang="en-US" sz="1600" dirty="0"/>
-              <a:t>Item3</a:t>
-            </a:r>
-          </a:p>
-        </p:txBody>
-      </p:sp>
-      <p:sp>
-        <p:nvSpPr>
-          <p:cNvPr id="17" name="TextBox 16">
-            <a:extLst>
-              <a:ext uri="{FF2B5EF4-FFF2-40B4-BE49-F238E27FC236}">
-                <a16:creationId xmlns:a16="http://schemas.microsoft.com/office/drawing/2014/main" id="{4C306127-6333-4619-A88F-1CB2C533E504}"/>
-              </a:ext>
-            </a:extLst>
-          </p:cNvPr>
-          <p:cNvSpPr txBox="1"/>
-          <p:nvPr/>
-        </p:nvSpPr>
-        <p:spPr>
-          <a:xfrm>
-            <a:off x="5052280" y="5109566"/>
-            <a:ext cx="863975" cy="338554"/>
-          </a:xfrm>
-          <a:prstGeom prst="rect">
-            <a:avLst/>
-          </a:prstGeom>
-          <a:noFill/>
-        </p:spPr>
-        <p:txBody>
-          <a:bodyPr wrap="square" rtlCol="0">
-            <a:spAutoFit/>
-          </a:bodyPr>
-          <a:lstStyle/>
-          <a:p>
-            <a:r>
-              <a:rPr lang="en-US" sz="1600" dirty="0"/>
-              <a:t>Item4</a:t>
-            </a:r>
-          </a:p>
-        </p:txBody>
-      </p:sp>
-      <p:sp>
-        <p:nvSpPr>
-          <p:cNvPr id="18" name="TextBox 17">
-            <a:extLst>
-              <a:ext uri="{FF2B5EF4-FFF2-40B4-BE49-F238E27FC236}">
-                <a16:creationId xmlns:a16="http://schemas.microsoft.com/office/drawing/2014/main" id="{CD8D9C7C-EC18-4406-A021-74FC63048D68}"/>
-              </a:ext>
-            </a:extLst>
-          </p:cNvPr>
-          <p:cNvSpPr txBox="1"/>
-          <p:nvPr/>
-        </p:nvSpPr>
-        <p:spPr>
-          <a:xfrm>
-            <a:off x="6070972" y="5109566"/>
-            <a:ext cx="863975" cy="338554"/>
-          </a:xfrm>
-          <a:prstGeom prst="rect">
-            <a:avLst/>
-          </a:prstGeom>
-          <a:noFill/>
-        </p:spPr>
-        <p:txBody>
-          <a:bodyPr wrap="square" rtlCol="0">
-            <a:spAutoFit/>
-          </a:bodyPr>
-          <a:lstStyle/>
-          <a:p>
-            <a:r>
-              <a:rPr lang="en-US" sz="1600" dirty="0"/>
-              <a:t>Item5</a:t>
-            </a:r>
-          </a:p>
-        </p:txBody>
-      </p:sp>
-      <p:sp>
-        <p:nvSpPr>
-          <p:cNvPr id="19" name="TextBox 18">
-            <a:extLst>
-              <a:ext uri="{FF2B5EF4-FFF2-40B4-BE49-F238E27FC236}">
-                <a16:creationId xmlns:a16="http://schemas.microsoft.com/office/drawing/2014/main" id="{D014521F-232A-41AF-96CB-08C55CEBABBC}"/>
-              </a:ext>
-            </a:extLst>
-          </p:cNvPr>
-          <p:cNvSpPr txBox="1"/>
-          <p:nvPr/>
-        </p:nvSpPr>
-        <p:spPr>
-          <a:xfrm>
-            <a:off x="7086647" y="5109566"/>
-            <a:ext cx="863975" cy="338554"/>
-          </a:xfrm>
-          <a:prstGeom prst="rect">
-            <a:avLst/>
-          </a:prstGeom>
-          <a:noFill/>
-        </p:spPr>
-        <p:txBody>
-          <a:bodyPr wrap="square" rtlCol="0">
-            <a:spAutoFit/>
-          </a:bodyPr>
-          <a:lstStyle/>
-          <a:p>
-            <a:r>
-              <a:rPr lang="en-US" sz="1600" dirty="0"/>
-              <a:t>Item6</a:t>
-            </a:r>
-          </a:p>
-        </p:txBody>
-      </p:sp>
-    </p:spTree>
-    <p:extLst>
-      <p:ext uri="{BB962C8B-B14F-4D97-AF65-F5344CB8AC3E}">
-        <p14:creationId xmlns:p14="http://schemas.microsoft.com/office/powerpoint/2010/main" val="2688681558"/>
-      </p:ext>
-    </p:extLst>
-  </p:cSld>
-  <p:clrMapOvr>
-    <a:masterClrMapping/>
-  </p:clrMapOvr>
-</p:sld>
-</file>
-
-<file path=ppt/slides/slide40.xml><?xml version="1.0" encoding="utf-8"?>
+<file path=ppt/slides/slide41.xml><?xml version="1.0" encoding="utf-8"?>
 <p:sld xmlns:a="http://schemas.openxmlformats.org/drawingml/2006/main" xmlns:r="http://schemas.openxmlformats.org/officeDocument/2006/relationships" xmlns:p="http://schemas.openxmlformats.org/presentationml/2006/main">
   <p:cSld>
     <p:spTree>

</xml_diff>